<commit_message>
Update menu app screenshot
</commit_message>
<xml_diff>
--- a/img/portfolio/temp-imgs/thumbs.pptx
+++ b/img/portfolio/temp-imgs/thumbs.pptx
@@ -3621,8 +3621,8 @@
         </p:blipFill>
         <p:spPr>
           <a:xfrm>
-            <a:off x="198518" y="111662"/>
-            <a:ext cx="11794964" cy="6634676"/>
+            <a:off x="267530" y="111662"/>
+            <a:ext cx="11656940" cy="6634676"/>
           </a:xfrm>
           <a:prstGeom prst="rect">
             <a:avLst/>

</xml_diff>

<commit_message>
added bike-share project to portfolio
</commit_message>
<xml_diff>
--- a/img/portfolio/temp-imgs/thumbs.pptx
+++ b/img/portfolio/temp-imgs/thumbs.pptx
@@ -6,11 +6,12 @@
   </p:sldMasterIdLst>
   <p:sldIdLst>
     <p:sldId id="259" r:id="rId2"/>
-    <p:sldId id="257" r:id="rId3"/>
-    <p:sldId id="262" r:id="rId4"/>
-    <p:sldId id="258" r:id="rId5"/>
-    <p:sldId id="260" r:id="rId6"/>
-    <p:sldId id="261" r:id="rId7"/>
+    <p:sldId id="263" r:id="rId3"/>
+    <p:sldId id="257" r:id="rId4"/>
+    <p:sldId id="262" r:id="rId5"/>
+    <p:sldId id="258" r:id="rId6"/>
+    <p:sldId id="260" r:id="rId7"/>
+    <p:sldId id="261" r:id="rId8"/>
   </p:sldIdLst>
   <p:sldSz cx="12192000" cy="6858000"/>
   <p:notesSz cx="6858000" cy="9144000"/>
@@ -246,7 +247,7 @@
           <a:p>
             <a:fld id="{C6C7E254-4BFE-4DC3-A1C5-AD0DA256311E}" type="datetimeFigureOut">
               <a:rPr lang="en-US" smtClean="0"/>
-              <a:t>8/7/2016</a:t>
+              <a:t>12/26/2016</a:t>
             </a:fld>
             <a:endParaRPr lang="en-US"/>
           </a:p>
@@ -414,7 +415,7 @@
           <a:p>
             <a:fld id="{C6C7E254-4BFE-4DC3-A1C5-AD0DA256311E}" type="datetimeFigureOut">
               <a:rPr lang="en-US" smtClean="0"/>
-              <a:t>8/7/2016</a:t>
+              <a:t>12/26/2016</a:t>
             </a:fld>
             <a:endParaRPr lang="en-US"/>
           </a:p>
@@ -592,7 +593,7 @@
           <a:p>
             <a:fld id="{C6C7E254-4BFE-4DC3-A1C5-AD0DA256311E}" type="datetimeFigureOut">
               <a:rPr lang="en-US" smtClean="0"/>
-              <a:t>8/7/2016</a:t>
+              <a:t>12/26/2016</a:t>
             </a:fld>
             <a:endParaRPr lang="en-US"/>
           </a:p>
@@ -760,7 +761,7 @@
           <a:p>
             <a:fld id="{C6C7E254-4BFE-4DC3-A1C5-AD0DA256311E}" type="datetimeFigureOut">
               <a:rPr lang="en-US" smtClean="0"/>
-              <a:t>8/7/2016</a:t>
+              <a:t>12/26/2016</a:t>
             </a:fld>
             <a:endParaRPr lang="en-US"/>
           </a:p>
@@ -1005,7 +1006,7 @@
           <a:p>
             <a:fld id="{C6C7E254-4BFE-4DC3-A1C5-AD0DA256311E}" type="datetimeFigureOut">
               <a:rPr lang="en-US" smtClean="0"/>
-              <a:t>8/7/2016</a:t>
+              <a:t>12/26/2016</a:t>
             </a:fld>
             <a:endParaRPr lang="en-US"/>
           </a:p>
@@ -1234,7 +1235,7 @@
           <a:p>
             <a:fld id="{C6C7E254-4BFE-4DC3-A1C5-AD0DA256311E}" type="datetimeFigureOut">
               <a:rPr lang="en-US" smtClean="0"/>
-              <a:t>8/7/2016</a:t>
+              <a:t>12/26/2016</a:t>
             </a:fld>
             <a:endParaRPr lang="en-US"/>
           </a:p>
@@ -1598,7 +1599,7 @@
           <a:p>
             <a:fld id="{C6C7E254-4BFE-4DC3-A1C5-AD0DA256311E}" type="datetimeFigureOut">
               <a:rPr lang="en-US" smtClean="0"/>
-              <a:t>8/7/2016</a:t>
+              <a:t>12/26/2016</a:t>
             </a:fld>
             <a:endParaRPr lang="en-US"/>
           </a:p>
@@ -1715,7 +1716,7 @@
           <a:p>
             <a:fld id="{C6C7E254-4BFE-4DC3-A1C5-AD0DA256311E}" type="datetimeFigureOut">
               <a:rPr lang="en-US" smtClean="0"/>
-              <a:t>8/7/2016</a:t>
+              <a:t>12/26/2016</a:t>
             </a:fld>
             <a:endParaRPr lang="en-US"/>
           </a:p>
@@ -1810,7 +1811,7 @@
           <a:p>
             <a:fld id="{C6C7E254-4BFE-4DC3-A1C5-AD0DA256311E}" type="datetimeFigureOut">
               <a:rPr lang="en-US" smtClean="0"/>
-              <a:t>8/7/2016</a:t>
+              <a:t>12/26/2016</a:t>
             </a:fld>
             <a:endParaRPr lang="en-US"/>
           </a:p>
@@ -2085,7 +2086,7 @@
           <a:p>
             <a:fld id="{C6C7E254-4BFE-4DC3-A1C5-AD0DA256311E}" type="datetimeFigureOut">
               <a:rPr lang="en-US" smtClean="0"/>
-              <a:t>8/7/2016</a:t>
+              <a:t>12/26/2016</a:t>
             </a:fld>
             <a:endParaRPr lang="en-US"/>
           </a:p>
@@ -2337,7 +2338,7 @@
           <a:p>
             <a:fld id="{C6C7E254-4BFE-4DC3-A1C5-AD0DA256311E}" type="datetimeFigureOut">
               <a:rPr lang="en-US" smtClean="0"/>
-              <a:t>8/7/2016</a:t>
+              <a:t>12/26/2016</a:t>
             </a:fld>
             <a:endParaRPr lang="en-US"/>
           </a:p>
@@ -2548,7 +2549,7 @@
           <a:p>
             <a:fld id="{C6C7E254-4BFE-4DC3-A1C5-AD0DA256311E}" type="datetimeFigureOut">
               <a:rPr lang="en-US" smtClean="0"/>
-              <a:t>8/7/2016</a:t>
+              <a:t>12/26/2016</a:t>
             </a:fld>
             <a:endParaRPr lang="en-US"/>
           </a:p>
@@ -2998,6 +2999,109 @@
       </p:sp>
       <p:pic>
         <p:nvPicPr>
+          <p:cNvPr id="3" name="Picture 2"/>
+          <p:cNvPicPr>
+            <a:picLocks noChangeAspect="1"/>
+          </p:cNvPicPr>
+          <p:nvPr/>
+        </p:nvPicPr>
+        <p:blipFill>
+          <a:blip r:embed="rId2">
+            <a:extLst>
+              <a:ext uri="{28A0092B-C50C-407E-A947-70E740481C1C}">
+                <a14:useLocalDpi xmlns:a14="http://schemas.microsoft.com/office/drawing/2010/main" val="0"/>
+              </a:ext>
+            </a:extLst>
+          </a:blip>
+          <a:stretch>
+            <a:fillRect/>
+          </a:stretch>
+        </p:blipFill>
+        <p:spPr>
+          <a:xfrm>
+            <a:off x="104893" y="365760"/>
+            <a:ext cx="11982214" cy="6126480"/>
+          </a:xfrm>
+          <a:prstGeom prst="rect">
+            <a:avLst/>
+          </a:prstGeom>
+        </p:spPr>
+      </p:pic>
+    </p:spTree>
+    <p:extLst>
+      <p:ext uri="{BB962C8B-B14F-4D97-AF65-F5344CB8AC3E}">
+        <p14:creationId xmlns:p14="http://schemas.microsoft.com/office/powerpoint/2010/main" val="3666057165"/>
+      </p:ext>
+    </p:extLst>
+  </p:cSld>
+  <p:clrMapOvr>
+    <a:masterClrMapping/>
+  </p:clrMapOvr>
+</p:sld>
+</file>
+
+<file path=ppt/slides/slide2.xml><?xml version="1.0" encoding="utf-8"?>
+<p:sld xmlns:a="http://schemas.openxmlformats.org/drawingml/2006/main" xmlns:r="http://schemas.openxmlformats.org/officeDocument/2006/relationships" xmlns:p="http://schemas.openxmlformats.org/presentationml/2006/main">
+  <p:cSld>
+    <p:spTree>
+      <p:nvGrpSpPr>
+        <p:cNvPr id="1" name=""/>
+        <p:cNvGrpSpPr/>
+        <p:nvPr/>
+      </p:nvGrpSpPr>
+      <p:grpSpPr>
+        <a:xfrm>
+          <a:off x="0" y="0"/>
+          <a:ext cx="0" cy="0"/>
+          <a:chOff x="0" y="0"/>
+          <a:chExt cx="0" cy="0"/>
+        </a:xfrm>
+      </p:grpSpPr>
+      <p:sp>
+        <p:nvSpPr>
+          <p:cNvPr id="4" name="Rectangle 3"/>
+          <p:cNvSpPr/>
+          <p:nvPr/>
+        </p:nvSpPr>
+        <p:spPr>
+          <a:xfrm>
+            <a:off x="0" y="0"/>
+            <a:ext cx="12192000" cy="6858000"/>
+          </a:xfrm>
+          <a:prstGeom prst="rect">
+            <a:avLst/>
+          </a:prstGeom>
+          <a:solidFill>
+            <a:srgbClr val="222222"/>
+          </a:solidFill>
+        </p:spPr>
+        <p:style>
+          <a:lnRef idx="2">
+            <a:schemeClr val="accent1">
+              <a:shade val="50000"/>
+            </a:schemeClr>
+          </a:lnRef>
+          <a:fillRef idx="1">
+            <a:schemeClr val="accent1"/>
+          </a:fillRef>
+          <a:effectRef idx="0">
+            <a:schemeClr val="accent1"/>
+          </a:effectRef>
+          <a:fontRef idx="minor">
+            <a:schemeClr val="lt1"/>
+          </a:fontRef>
+        </p:style>
+        <p:txBody>
+          <a:bodyPr rtlCol="0" anchor="ctr"/>
+          <a:lstStyle/>
+          <a:p>
+            <a:pPr algn="ctr"/>
+            <a:endParaRPr lang="en-US"/>
+          </a:p>
+        </p:txBody>
+      </p:sp>
+      <p:pic>
+        <p:nvPicPr>
           <p:cNvPr id="2" name="Picture 1"/>
           <p:cNvPicPr>
             <a:picLocks noChangeAspect="1"/>
@@ -3029,7 +3133,7 @@
     </p:spTree>
     <p:extLst>
       <p:ext uri="{BB962C8B-B14F-4D97-AF65-F5344CB8AC3E}">
-        <p14:creationId xmlns:p14="http://schemas.microsoft.com/office/powerpoint/2010/main" val="3666057165"/>
+        <p14:creationId xmlns:p14="http://schemas.microsoft.com/office/powerpoint/2010/main" val="47768738"/>
       </p:ext>
     </p:extLst>
   </p:cSld>
@@ -3039,7 +3143,7 @@
 </p:sld>
 </file>
 
-<file path=ppt/slides/slide2.xml><?xml version="1.0" encoding="utf-8"?>
+<file path=ppt/slides/slide3.xml><?xml version="1.0" encoding="utf-8"?>
 <p:sld xmlns:a="http://schemas.openxmlformats.org/drawingml/2006/main" xmlns:r="http://schemas.openxmlformats.org/officeDocument/2006/relationships" xmlns:p="http://schemas.openxmlformats.org/presentationml/2006/main">
   <p:cSld>
     <p:spTree>
@@ -3232,7 +3336,7 @@
 </p:sld>
 </file>
 
-<file path=ppt/slides/slide3.xml><?xml version="1.0" encoding="utf-8"?>
+<file path=ppt/slides/slide4.xml><?xml version="1.0" encoding="utf-8"?>
 <p:sld xmlns:a="http://schemas.openxmlformats.org/drawingml/2006/main" xmlns:r="http://schemas.openxmlformats.org/officeDocument/2006/relationships" xmlns:p="http://schemas.openxmlformats.org/presentationml/2006/main">
   <p:cSld>
     <p:spTree>
@@ -3334,7 +3438,7 @@
 </p:sld>
 </file>
 
-<file path=ppt/slides/slide4.xml><?xml version="1.0" encoding="utf-8"?>
+<file path=ppt/slides/slide5.xml><?xml version="1.0" encoding="utf-8"?>
 <p:sld xmlns:a="http://schemas.openxmlformats.org/drawingml/2006/main" xmlns:r="http://schemas.openxmlformats.org/officeDocument/2006/relationships" xmlns:p="http://schemas.openxmlformats.org/presentationml/2006/main">
   <p:cSld>
     <p:spTree>
@@ -3437,7 +3541,7 @@
 </p:sld>
 </file>
 
-<file path=ppt/slides/slide5.xml><?xml version="1.0" encoding="utf-8"?>
+<file path=ppt/slides/slide6.xml><?xml version="1.0" encoding="utf-8"?>
 <p:sld xmlns:a="http://schemas.openxmlformats.org/drawingml/2006/main" xmlns:r="http://schemas.openxmlformats.org/officeDocument/2006/relationships" xmlns:p="http://schemas.openxmlformats.org/presentationml/2006/main">
   <p:cSld>
     <p:spTree>
@@ -3539,7 +3643,7 @@
 </p:sld>
 </file>
 
-<file path=ppt/slides/slide6.xml><?xml version="1.0" encoding="utf-8"?>
+<file path=ppt/slides/slide7.xml><?xml version="1.0" encoding="utf-8"?>
 <p:sld xmlns:a="http://schemas.openxmlformats.org/drawingml/2006/main" xmlns:r="http://schemas.openxmlformats.org/officeDocument/2006/relationships" xmlns:p="http://schemas.openxmlformats.org/presentationml/2006/main">
   <p:cSld>
     <p:spTree>

</xml_diff>